<commit_message>
day 2 wrapped up
finished today's session.

started with functions and it is ongoing
</commit_message>
<xml_diff>
--- a/PresentationPPTPDFS/Day 1 - C Sharp Workshop Bucks College Group - Introduction.pptx
+++ b/PresentationPPTPDFS/Day 1 - C Sharp Workshop Bucks College Group - Introduction.pptx
@@ -5,10 +5,10 @@
     <p:sldMasterId id="2147483705" r:id="rId4"/>
   </p:sldMasterIdLst>
   <p:notesMasterIdLst>
-    <p:notesMasterId r:id="rId19"/>
+    <p:notesMasterId r:id="rId23"/>
   </p:notesMasterIdLst>
   <p:handoutMasterIdLst>
-    <p:handoutMasterId r:id="rId20"/>
+    <p:handoutMasterId r:id="rId24"/>
   </p:handoutMasterIdLst>
   <p:sldIdLst>
     <p:sldId id="1866" r:id="rId5"/>
@@ -22,9 +22,13 @@
     <p:sldId id="1885" r:id="rId13"/>
     <p:sldId id="1886" r:id="rId14"/>
     <p:sldId id="1883" r:id="rId15"/>
-    <p:sldId id="1884" r:id="rId16"/>
-    <p:sldId id="1875" r:id="rId17"/>
-    <p:sldId id="1876" r:id="rId18"/>
+    <p:sldId id="1887" r:id="rId16"/>
+    <p:sldId id="1888" r:id="rId17"/>
+    <p:sldId id="1889" r:id="rId18"/>
+    <p:sldId id="1890" r:id="rId19"/>
+    <p:sldId id="1884" r:id="rId20"/>
+    <p:sldId id="1875" r:id="rId21"/>
+    <p:sldId id="1876" r:id="rId22"/>
   </p:sldIdLst>
   <p:sldSz cx="12192000" cy="6858000"/>
   <p:notesSz cx="6858000" cy="9144000"/>
@@ -169,6 +173,10 @@
             <p14:sldId id="1885"/>
             <p14:sldId id="1886"/>
             <p14:sldId id="1883"/>
+            <p14:sldId id="1887"/>
+            <p14:sldId id="1888"/>
+            <p14:sldId id="1889"/>
+            <p14:sldId id="1890"/>
             <p14:sldId id="1884"/>
             <p14:sldId id="1875"/>
             <p14:sldId id="1876"/>
@@ -482,7 +490,7 @@
           <a:p>
             <a:fld id="{148EE06D-E2C5-4DF1-B3C1-8E9169AAB10D}" type="datetimeFigureOut">
               <a:rPr lang="en-US" smtClean="0"/>
-              <a:t>6/13/2023</a:t>
+              <a:t>6/15/2023</a:t>
             </a:fld>
             <a:endParaRPr lang="en-US" dirty="0"/>
           </a:p>
@@ -1633,7 +1641,7 @@
             <a:fld id="{6DEB7EE2-04A2-4FB2-9625-C9C73AC4D32F}" type="slidenum">
               <a:rPr lang="en-US" altLang="en-US" smtClean="0"/>
               <a:pPr/>
-              <a:t>13</a:t>
+              <a:t>17</a:t>
             </a:fld>
             <a:endParaRPr lang="en-US" altLang="en-US" dirty="0"/>
           </a:p>
@@ -2260,7 +2268,7 @@
           <a:p>
             <a:fld id="{50A1B9BC-7BE7-4893-90FD-CC95830FD8F2}" type="datetimeFigureOut">
               <a:rPr lang="en-US" smtClean="0"/>
-              <a:t>6/13/2023</a:t>
+              <a:t>6/15/2023</a:t>
             </a:fld>
             <a:endParaRPr lang="en-US" dirty="0"/>
           </a:p>
@@ -4353,7 +4361,7 @@
             <a:fld id="{1D364696-E1F3-49EF-AEC8-730A16D9A23F}" type="datetimeFigureOut">
               <a:rPr lang="en-US" altLang="en-US" smtClean="0"/>
               <a:pPr/>
-              <a:t>6/13/2023</a:t>
+              <a:t>6/15/2023</a:t>
             </a:fld>
             <a:endParaRPr lang="en-US" altLang="en-US" dirty="0"/>
           </a:p>
@@ -5051,13 +5059,13 @@
   <p:clrMapOvr>
     <a:masterClrMapping/>
   </p:clrMapOvr>
-  <mc:AlternateContent xmlns:mc="http://schemas.openxmlformats.org/markup-compatibility/2006">
-    <mc:Choice xmlns:p14="http://schemas.microsoft.com/office/powerpoint/2010/main" Requires="p14">
+  <mc:AlternateContent xmlns:mc="http://schemas.openxmlformats.org/markup-compatibility/2006" xmlns:p14="http://schemas.microsoft.com/office/powerpoint/2010/main">
+    <mc:Choice Requires="p14">
       <p:transition spd="med" p14:dur="700">
         <p:fade/>
       </p:transition>
     </mc:Choice>
-    <mc:Fallback>
+    <mc:Fallback xmlns="">
       <p:transition spd="med">
         <p:fade/>
       </p:transition>
@@ -5311,6 +5319,848 @@
           <a:p>
             <a:r>
               <a:rPr lang="en-US" dirty="0"/>
+              <a:t>Functions</a:t>
+            </a:r>
+          </a:p>
+        </p:txBody>
+      </p:sp>
+      <p:sp>
+        <p:nvSpPr>
+          <p:cNvPr id="2" name="Text Placeholder 1">
+            <a:extLst>
+              <a:ext uri="{FF2B5EF4-FFF2-40B4-BE49-F238E27FC236}">
+                <a16:creationId xmlns:a16="http://schemas.microsoft.com/office/drawing/2014/main" id="{3F36812B-2065-4A2B-B59B-8957022687BC}"/>
+              </a:ext>
+            </a:extLst>
+          </p:cNvPr>
+          <p:cNvSpPr>
+            <a:spLocks noGrp="1"/>
+          </p:cNvSpPr>
+          <p:nvPr>
+            <p:ph type="body" sz="quarter" idx="11"/>
+          </p:nvPr>
+        </p:nvSpPr>
+        <p:spPr>
+          <a:xfrm>
+            <a:off x="762000" y="1905000"/>
+            <a:ext cx="6477000" cy="3276600"/>
+          </a:xfrm>
+        </p:spPr>
+        <p:txBody>
+          <a:bodyPr vert="horz" lIns="91440" tIns="45720" rIns="91440" bIns="45720" rtlCol="0" anchor="t">
+            <a:normAutofit/>
+          </a:bodyPr>
+          <a:lstStyle/>
+          <a:p>
+            <a:pPr marL="285750" indent="-285750">
+              <a:buFont typeface="Arial" panose="020B0604020202020204" pitchFamily="34" charset="0"/>
+              <a:buChar char="•"/>
+            </a:pPr>
+            <a:r>
+              <a:rPr lang="en-US" altLang="en-US" sz="2400" dirty="0"/>
+              <a:t>Containerization</a:t>
+            </a:r>
+          </a:p>
+          <a:p>
+            <a:pPr marL="285750" indent="-285750">
+              <a:buFont typeface="Arial" panose="020B0604020202020204" pitchFamily="34" charset="0"/>
+              <a:buChar char="•"/>
+            </a:pPr>
+            <a:r>
+              <a:rPr lang="en-US" altLang="en-US" sz="2400" dirty="0"/>
+              <a:t>Calculator </a:t>
+            </a:r>
+          </a:p>
+        </p:txBody>
+      </p:sp>
+      <p:sp>
+        <p:nvSpPr>
+          <p:cNvPr id="3" name="TextBox 2">
+            <a:extLst>
+              <a:ext uri="{FF2B5EF4-FFF2-40B4-BE49-F238E27FC236}">
+                <a16:creationId xmlns:a16="http://schemas.microsoft.com/office/drawing/2014/main" id="{25F00EF3-70C3-32DB-02AF-51455AB20D6F}"/>
+              </a:ext>
+            </a:extLst>
+          </p:cNvPr>
+          <p:cNvSpPr txBox="1"/>
+          <p:nvPr/>
+        </p:nvSpPr>
+        <p:spPr>
+          <a:xfrm>
+            <a:off x="569343" y="6142039"/>
+            <a:ext cx="3226279" cy="276999"/>
+          </a:xfrm>
+          <a:prstGeom prst="rect">
+            <a:avLst/>
+          </a:prstGeom>
+          <a:noFill/>
+        </p:spPr>
+        <p:txBody>
+          <a:bodyPr wrap="square" rtlCol="0">
+            <a:spAutoFit/>
+          </a:bodyPr>
+          <a:lstStyle/>
+          <a:p>
+            <a:r>
+              <a:rPr lang="en-US" sz="1200" dirty="0"/>
+              <a:t>C Sharp Workshop for Bucks College Group</a:t>
+            </a:r>
+          </a:p>
+        </p:txBody>
+      </p:sp>
+      <p:sp>
+        <p:nvSpPr>
+          <p:cNvPr id="4" name="TextBox 3">
+            <a:extLst>
+              <a:ext uri="{FF2B5EF4-FFF2-40B4-BE49-F238E27FC236}">
+                <a16:creationId xmlns:a16="http://schemas.microsoft.com/office/drawing/2014/main" id="{49E4D80E-8AAB-6C00-1319-EA17C69A7EDE}"/>
+              </a:ext>
+            </a:extLst>
+          </p:cNvPr>
+          <p:cNvSpPr txBox="1"/>
+          <p:nvPr/>
+        </p:nvSpPr>
+        <p:spPr>
+          <a:xfrm>
+            <a:off x="8589034" y="6143024"/>
+            <a:ext cx="3226279" cy="276999"/>
+          </a:xfrm>
+          <a:prstGeom prst="rect">
+            <a:avLst/>
+          </a:prstGeom>
+          <a:noFill/>
+        </p:spPr>
+        <p:txBody>
+          <a:bodyPr wrap="square" rtlCol="0">
+            <a:spAutoFit/>
+          </a:bodyPr>
+          <a:lstStyle/>
+          <a:p>
+            <a:r>
+              <a:rPr lang="en-US" sz="1200" dirty="0"/>
+              <a:t>Programming Tutor: Jay (Vijayasimha BR)</a:t>
+            </a:r>
+          </a:p>
+        </p:txBody>
+      </p:sp>
+    </p:spTree>
+    <p:extLst>
+      <p:ext uri="{BB962C8B-B14F-4D97-AF65-F5344CB8AC3E}">
+        <p14:creationId xmlns:p14="http://schemas.microsoft.com/office/powerpoint/2010/main" val="1230971682"/>
+      </p:ext>
+    </p:extLst>
+  </p:cSld>
+  <p:clrMapOvr>
+    <a:masterClrMapping/>
+  </p:clrMapOvr>
+  <mc:AlternateContent xmlns:mc="http://schemas.openxmlformats.org/markup-compatibility/2006">
+    <mc:Choice xmlns:p14="http://schemas.microsoft.com/office/powerpoint/2010/main" Requires="p14">
+      <p:transition spd="med" p14:dur="700">
+        <p:fade/>
+      </p:transition>
+    </mc:Choice>
+    <mc:Fallback>
+      <p:transition spd="med">
+        <p:fade/>
+      </p:transition>
+    </mc:Fallback>
+  </mc:AlternateContent>
+</p:sld>
+</file>
+
+<file path=ppt/slides/slide13.xml><?xml version="1.0" encoding="utf-8"?>
+<p:sld xmlns:a="http://schemas.openxmlformats.org/drawingml/2006/main" xmlns:r="http://schemas.openxmlformats.org/officeDocument/2006/relationships" xmlns:p="http://schemas.openxmlformats.org/presentationml/2006/main">
+  <p:cSld>
+    <p:bg>
+      <p:bgPr>
+        <a:solidFill>
+          <a:schemeClr val="accent3"/>
+        </a:solidFill>
+        <a:effectLst/>
+      </p:bgPr>
+    </p:bg>
+    <p:spTree>
+      <p:nvGrpSpPr>
+        <p:cNvPr id="1" name=""/>
+        <p:cNvGrpSpPr/>
+        <p:nvPr/>
+      </p:nvGrpSpPr>
+      <p:grpSpPr>
+        <a:xfrm>
+          <a:off x="0" y="0"/>
+          <a:ext cx="0" cy="0"/>
+          <a:chOff x="0" y="0"/>
+          <a:chExt cx="0" cy="0"/>
+        </a:xfrm>
+      </p:grpSpPr>
+      <p:sp>
+        <p:nvSpPr>
+          <p:cNvPr id="5" name="Title 4">
+            <a:extLst>
+              <a:ext uri="{FF2B5EF4-FFF2-40B4-BE49-F238E27FC236}">
+                <a16:creationId xmlns:a16="http://schemas.microsoft.com/office/drawing/2014/main" id="{E8C5EA60-12FC-4FB7-9CED-CDC28177F4B1}"/>
+              </a:ext>
+            </a:extLst>
+          </p:cNvPr>
+          <p:cNvSpPr>
+            <a:spLocks noGrp="1"/>
+          </p:cNvSpPr>
+          <p:nvPr>
+            <p:ph type="title"/>
+          </p:nvPr>
+        </p:nvSpPr>
+        <p:spPr/>
+        <p:txBody>
+          <a:bodyPr/>
+          <a:lstStyle/>
+          <a:p>
+            <a:r>
+              <a:rPr lang="en-US" dirty="0"/>
+              <a:t>Operators </a:t>
+            </a:r>
+          </a:p>
+        </p:txBody>
+      </p:sp>
+      <p:sp>
+        <p:nvSpPr>
+          <p:cNvPr id="2" name="Text Placeholder 1">
+            <a:extLst>
+              <a:ext uri="{FF2B5EF4-FFF2-40B4-BE49-F238E27FC236}">
+                <a16:creationId xmlns:a16="http://schemas.microsoft.com/office/drawing/2014/main" id="{3F36812B-2065-4A2B-B59B-8957022687BC}"/>
+              </a:ext>
+            </a:extLst>
+          </p:cNvPr>
+          <p:cNvSpPr>
+            <a:spLocks noGrp="1"/>
+          </p:cNvSpPr>
+          <p:nvPr>
+            <p:ph type="body" sz="quarter" idx="11"/>
+          </p:nvPr>
+        </p:nvSpPr>
+        <p:spPr>
+          <a:xfrm>
+            <a:off x="762000" y="1905000"/>
+            <a:ext cx="6477000" cy="3276600"/>
+          </a:xfrm>
+        </p:spPr>
+        <p:txBody>
+          <a:bodyPr vert="horz" lIns="91440" tIns="45720" rIns="91440" bIns="45720" rtlCol="0" anchor="t">
+            <a:normAutofit/>
+          </a:bodyPr>
+          <a:lstStyle/>
+          <a:p>
+            <a:pPr marL="285750" indent="-285750">
+              <a:buFont typeface="Arial" panose="020B0604020202020204" pitchFamily="34" charset="0"/>
+              <a:buChar char="•"/>
+            </a:pPr>
+            <a:r>
+              <a:rPr lang="en-US" altLang="en-US" sz="2400" dirty="0"/>
+              <a:t>+</a:t>
+            </a:r>
+          </a:p>
+          <a:p>
+            <a:pPr marL="285750" indent="-285750">
+              <a:buFont typeface="Arial" panose="020B0604020202020204" pitchFamily="34" charset="0"/>
+              <a:buChar char="•"/>
+            </a:pPr>
+            <a:r>
+              <a:rPr lang="en-US" altLang="en-US" sz="2400" dirty="0"/>
+              <a:t>-</a:t>
+            </a:r>
+          </a:p>
+          <a:p>
+            <a:pPr marL="285750" indent="-285750">
+              <a:buFont typeface="Arial" panose="020B0604020202020204" pitchFamily="34" charset="0"/>
+              <a:buChar char="•"/>
+            </a:pPr>
+            <a:r>
+              <a:rPr lang="en-US" altLang="en-US" sz="2400" dirty="0"/>
+              <a:t>*</a:t>
+            </a:r>
+          </a:p>
+          <a:p>
+            <a:pPr marL="285750" indent="-285750">
+              <a:buFont typeface="Arial" panose="020B0604020202020204" pitchFamily="34" charset="0"/>
+              <a:buChar char="•"/>
+            </a:pPr>
+            <a:r>
+              <a:rPr lang="en-US" altLang="en-US" sz="2400" dirty="0"/>
+              <a:t>/</a:t>
+            </a:r>
+          </a:p>
+          <a:p>
+            <a:pPr marL="285750" indent="-285750">
+              <a:buFont typeface="Arial" panose="020B0604020202020204" pitchFamily="34" charset="0"/>
+              <a:buChar char="•"/>
+            </a:pPr>
+            <a:r>
+              <a:rPr lang="en-US" altLang="en-US" sz="2400" dirty="0"/>
+              <a:t>=</a:t>
+            </a:r>
+          </a:p>
+        </p:txBody>
+      </p:sp>
+      <p:sp>
+        <p:nvSpPr>
+          <p:cNvPr id="3" name="TextBox 2">
+            <a:extLst>
+              <a:ext uri="{FF2B5EF4-FFF2-40B4-BE49-F238E27FC236}">
+                <a16:creationId xmlns:a16="http://schemas.microsoft.com/office/drawing/2014/main" id="{25F00EF3-70C3-32DB-02AF-51455AB20D6F}"/>
+              </a:ext>
+            </a:extLst>
+          </p:cNvPr>
+          <p:cNvSpPr txBox="1"/>
+          <p:nvPr/>
+        </p:nvSpPr>
+        <p:spPr>
+          <a:xfrm>
+            <a:off x="569343" y="6142039"/>
+            <a:ext cx="3226279" cy="276999"/>
+          </a:xfrm>
+          <a:prstGeom prst="rect">
+            <a:avLst/>
+          </a:prstGeom>
+          <a:noFill/>
+        </p:spPr>
+        <p:txBody>
+          <a:bodyPr wrap="square" rtlCol="0">
+            <a:spAutoFit/>
+          </a:bodyPr>
+          <a:lstStyle/>
+          <a:p>
+            <a:r>
+              <a:rPr lang="en-US" sz="1200" dirty="0"/>
+              <a:t>C Sharp Workshop for Bucks College Group</a:t>
+            </a:r>
+          </a:p>
+        </p:txBody>
+      </p:sp>
+      <p:sp>
+        <p:nvSpPr>
+          <p:cNvPr id="4" name="TextBox 3">
+            <a:extLst>
+              <a:ext uri="{FF2B5EF4-FFF2-40B4-BE49-F238E27FC236}">
+                <a16:creationId xmlns:a16="http://schemas.microsoft.com/office/drawing/2014/main" id="{49E4D80E-8AAB-6C00-1319-EA17C69A7EDE}"/>
+              </a:ext>
+            </a:extLst>
+          </p:cNvPr>
+          <p:cNvSpPr txBox="1"/>
+          <p:nvPr/>
+        </p:nvSpPr>
+        <p:spPr>
+          <a:xfrm>
+            <a:off x="8589034" y="6143024"/>
+            <a:ext cx="3226279" cy="276999"/>
+          </a:xfrm>
+          <a:prstGeom prst="rect">
+            <a:avLst/>
+          </a:prstGeom>
+          <a:noFill/>
+        </p:spPr>
+        <p:txBody>
+          <a:bodyPr wrap="square" rtlCol="0">
+            <a:spAutoFit/>
+          </a:bodyPr>
+          <a:lstStyle/>
+          <a:p>
+            <a:r>
+              <a:rPr lang="en-US" sz="1200" dirty="0"/>
+              <a:t>Programming Tutor: Jay (Vijayasimha BR)</a:t>
+            </a:r>
+          </a:p>
+        </p:txBody>
+      </p:sp>
+    </p:spTree>
+    <p:extLst>
+      <p:ext uri="{BB962C8B-B14F-4D97-AF65-F5344CB8AC3E}">
+        <p14:creationId xmlns:p14="http://schemas.microsoft.com/office/powerpoint/2010/main" val="131501887"/>
+      </p:ext>
+    </p:extLst>
+  </p:cSld>
+  <p:clrMapOvr>
+    <a:masterClrMapping/>
+  </p:clrMapOvr>
+  <mc:AlternateContent xmlns:mc="http://schemas.openxmlformats.org/markup-compatibility/2006">
+    <mc:Choice xmlns:p14="http://schemas.microsoft.com/office/powerpoint/2010/main" Requires="p14">
+      <p:transition spd="med" p14:dur="700">
+        <p:fade/>
+      </p:transition>
+    </mc:Choice>
+    <mc:Fallback>
+      <p:transition spd="med">
+        <p:fade/>
+      </p:transition>
+    </mc:Fallback>
+  </mc:AlternateContent>
+</p:sld>
+</file>
+
+<file path=ppt/slides/slide14.xml><?xml version="1.0" encoding="utf-8"?>
+<p:sld xmlns:a="http://schemas.openxmlformats.org/drawingml/2006/main" xmlns:r="http://schemas.openxmlformats.org/officeDocument/2006/relationships" xmlns:p="http://schemas.openxmlformats.org/presentationml/2006/main">
+  <p:cSld>
+    <p:bg>
+      <p:bgPr>
+        <a:solidFill>
+          <a:schemeClr val="accent3"/>
+        </a:solidFill>
+        <a:effectLst/>
+      </p:bgPr>
+    </p:bg>
+    <p:spTree>
+      <p:nvGrpSpPr>
+        <p:cNvPr id="1" name=""/>
+        <p:cNvGrpSpPr/>
+        <p:nvPr/>
+      </p:nvGrpSpPr>
+      <p:grpSpPr>
+        <a:xfrm>
+          <a:off x="0" y="0"/>
+          <a:ext cx="0" cy="0"/>
+          <a:chOff x="0" y="0"/>
+          <a:chExt cx="0" cy="0"/>
+        </a:xfrm>
+      </p:grpSpPr>
+      <p:sp>
+        <p:nvSpPr>
+          <p:cNvPr id="5" name="Title 4">
+            <a:extLst>
+              <a:ext uri="{FF2B5EF4-FFF2-40B4-BE49-F238E27FC236}">
+                <a16:creationId xmlns:a16="http://schemas.microsoft.com/office/drawing/2014/main" id="{E8C5EA60-12FC-4FB7-9CED-CDC28177F4B1}"/>
+              </a:ext>
+            </a:extLst>
+          </p:cNvPr>
+          <p:cNvSpPr>
+            <a:spLocks noGrp="1"/>
+          </p:cNvSpPr>
+          <p:nvPr>
+            <p:ph type="title"/>
+          </p:nvPr>
+        </p:nvSpPr>
+        <p:spPr/>
+        <p:txBody>
+          <a:bodyPr/>
+          <a:lstStyle/>
+          <a:p>
+            <a:r>
+              <a:rPr lang="en-US" dirty="0"/>
+              <a:t>Operators </a:t>
+            </a:r>
+          </a:p>
+        </p:txBody>
+      </p:sp>
+      <p:sp>
+        <p:nvSpPr>
+          <p:cNvPr id="2" name="Text Placeholder 1">
+            <a:extLst>
+              <a:ext uri="{FF2B5EF4-FFF2-40B4-BE49-F238E27FC236}">
+                <a16:creationId xmlns:a16="http://schemas.microsoft.com/office/drawing/2014/main" id="{3F36812B-2065-4A2B-B59B-8957022687BC}"/>
+              </a:ext>
+            </a:extLst>
+          </p:cNvPr>
+          <p:cNvSpPr>
+            <a:spLocks noGrp="1"/>
+          </p:cNvSpPr>
+          <p:nvPr>
+            <p:ph type="body" sz="quarter" idx="11"/>
+          </p:nvPr>
+        </p:nvSpPr>
+        <p:spPr>
+          <a:xfrm>
+            <a:off x="762000" y="1905000"/>
+            <a:ext cx="9054860" cy="3276600"/>
+          </a:xfrm>
+        </p:spPr>
+        <p:txBody>
+          <a:bodyPr vert="horz" lIns="91440" tIns="45720" rIns="91440" bIns="45720" rtlCol="0" anchor="t">
+            <a:normAutofit/>
+          </a:bodyPr>
+          <a:lstStyle/>
+          <a:p>
+            <a:r>
+              <a:rPr lang="en-US" altLang="en-US" sz="5400" dirty="0"/>
+              <a:t>string </a:t>
+            </a:r>
+            <a:r>
+              <a:rPr lang="en-US" altLang="en-US" sz="5400" dirty="0" err="1"/>
+              <a:t>fancyoutputsum</a:t>
+            </a:r>
+            <a:r>
+              <a:rPr lang="en-US" altLang="en-US" sz="5400" dirty="0"/>
+              <a:t> = $"{num1} + {num2} = {sum}";</a:t>
+            </a:r>
+          </a:p>
+        </p:txBody>
+      </p:sp>
+      <p:sp>
+        <p:nvSpPr>
+          <p:cNvPr id="3" name="TextBox 2">
+            <a:extLst>
+              <a:ext uri="{FF2B5EF4-FFF2-40B4-BE49-F238E27FC236}">
+                <a16:creationId xmlns:a16="http://schemas.microsoft.com/office/drawing/2014/main" id="{25F00EF3-70C3-32DB-02AF-51455AB20D6F}"/>
+              </a:ext>
+            </a:extLst>
+          </p:cNvPr>
+          <p:cNvSpPr txBox="1"/>
+          <p:nvPr/>
+        </p:nvSpPr>
+        <p:spPr>
+          <a:xfrm>
+            <a:off x="569343" y="6142039"/>
+            <a:ext cx="3226279" cy="276999"/>
+          </a:xfrm>
+          <a:prstGeom prst="rect">
+            <a:avLst/>
+          </a:prstGeom>
+          <a:noFill/>
+        </p:spPr>
+        <p:txBody>
+          <a:bodyPr wrap="square" rtlCol="0">
+            <a:spAutoFit/>
+          </a:bodyPr>
+          <a:lstStyle/>
+          <a:p>
+            <a:r>
+              <a:rPr lang="en-US" sz="1200" dirty="0"/>
+              <a:t>C Sharp Workshop for Bucks College Group</a:t>
+            </a:r>
+          </a:p>
+        </p:txBody>
+      </p:sp>
+      <p:sp>
+        <p:nvSpPr>
+          <p:cNvPr id="4" name="TextBox 3">
+            <a:extLst>
+              <a:ext uri="{FF2B5EF4-FFF2-40B4-BE49-F238E27FC236}">
+                <a16:creationId xmlns:a16="http://schemas.microsoft.com/office/drawing/2014/main" id="{49E4D80E-8AAB-6C00-1319-EA17C69A7EDE}"/>
+              </a:ext>
+            </a:extLst>
+          </p:cNvPr>
+          <p:cNvSpPr txBox="1"/>
+          <p:nvPr/>
+        </p:nvSpPr>
+        <p:spPr>
+          <a:xfrm>
+            <a:off x="8589034" y="6143024"/>
+            <a:ext cx="3226279" cy="276999"/>
+          </a:xfrm>
+          <a:prstGeom prst="rect">
+            <a:avLst/>
+          </a:prstGeom>
+          <a:noFill/>
+        </p:spPr>
+        <p:txBody>
+          <a:bodyPr wrap="square" rtlCol="0">
+            <a:spAutoFit/>
+          </a:bodyPr>
+          <a:lstStyle/>
+          <a:p>
+            <a:r>
+              <a:rPr lang="en-US" sz="1200" dirty="0"/>
+              <a:t>Programming Tutor: Jay (Vijayasimha BR)</a:t>
+            </a:r>
+          </a:p>
+        </p:txBody>
+      </p:sp>
+    </p:spTree>
+    <p:extLst>
+      <p:ext uri="{BB962C8B-B14F-4D97-AF65-F5344CB8AC3E}">
+        <p14:creationId xmlns:p14="http://schemas.microsoft.com/office/powerpoint/2010/main" val="727290171"/>
+      </p:ext>
+    </p:extLst>
+  </p:cSld>
+  <p:clrMapOvr>
+    <a:masterClrMapping/>
+  </p:clrMapOvr>
+  <mc:AlternateContent xmlns:mc="http://schemas.openxmlformats.org/markup-compatibility/2006">
+    <mc:Choice xmlns:p14="http://schemas.microsoft.com/office/powerpoint/2010/main" Requires="p14">
+      <p:transition spd="med" p14:dur="700">
+        <p:fade/>
+      </p:transition>
+    </mc:Choice>
+    <mc:Fallback>
+      <p:transition spd="med">
+        <p:fade/>
+      </p:transition>
+    </mc:Fallback>
+  </mc:AlternateContent>
+</p:sld>
+</file>
+
+<file path=ppt/slides/slide15.xml><?xml version="1.0" encoding="utf-8"?>
+<p:sld xmlns:a="http://schemas.openxmlformats.org/drawingml/2006/main" xmlns:r="http://schemas.openxmlformats.org/officeDocument/2006/relationships" xmlns:p="http://schemas.openxmlformats.org/presentationml/2006/main">
+  <p:cSld>
+    <p:bg>
+      <p:bgPr>
+        <a:solidFill>
+          <a:schemeClr val="accent3"/>
+        </a:solidFill>
+        <a:effectLst/>
+      </p:bgPr>
+    </p:bg>
+    <p:spTree>
+      <p:nvGrpSpPr>
+        <p:cNvPr id="1" name=""/>
+        <p:cNvGrpSpPr/>
+        <p:nvPr/>
+      </p:nvGrpSpPr>
+      <p:grpSpPr>
+        <a:xfrm>
+          <a:off x="0" y="0"/>
+          <a:ext cx="0" cy="0"/>
+          <a:chOff x="0" y="0"/>
+          <a:chExt cx="0" cy="0"/>
+        </a:xfrm>
+      </p:grpSpPr>
+      <p:sp>
+        <p:nvSpPr>
+          <p:cNvPr id="5" name="Title 4">
+            <a:extLst>
+              <a:ext uri="{FF2B5EF4-FFF2-40B4-BE49-F238E27FC236}">
+                <a16:creationId xmlns:a16="http://schemas.microsoft.com/office/drawing/2014/main" id="{E8C5EA60-12FC-4FB7-9CED-CDC28177F4B1}"/>
+              </a:ext>
+            </a:extLst>
+          </p:cNvPr>
+          <p:cNvSpPr>
+            <a:spLocks noGrp="1"/>
+          </p:cNvSpPr>
+          <p:nvPr>
+            <p:ph type="title"/>
+          </p:nvPr>
+        </p:nvSpPr>
+        <p:spPr>
+          <a:xfrm>
+            <a:off x="865516" y="224990"/>
+            <a:ext cx="6476999" cy="1189037"/>
+          </a:xfrm>
+        </p:spPr>
+        <p:txBody>
+          <a:bodyPr/>
+          <a:lstStyle/>
+          <a:p>
+            <a:r>
+              <a:rPr lang="en-US" dirty="0"/>
+              <a:t>Functions </a:t>
+            </a:r>
+          </a:p>
+        </p:txBody>
+      </p:sp>
+      <p:sp>
+        <p:nvSpPr>
+          <p:cNvPr id="2" name="Text Placeholder 1">
+            <a:extLst>
+              <a:ext uri="{FF2B5EF4-FFF2-40B4-BE49-F238E27FC236}">
+                <a16:creationId xmlns:a16="http://schemas.microsoft.com/office/drawing/2014/main" id="{3F36812B-2065-4A2B-B59B-8957022687BC}"/>
+              </a:ext>
+            </a:extLst>
+          </p:cNvPr>
+          <p:cNvSpPr>
+            <a:spLocks noGrp="1"/>
+          </p:cNvSpPr>
+          <p:nvPr>
+            <p:ph type="body" sz="quarter" idx="11"/>
+          </p:nvPr>
+        </p:nvSpPr>
+        <p:spPr>
+          <a:xfrm>
+            <a:off x="569343" y="1190445"/>
+            <a:ext cx="10032521" cy="4848046"/>
+          </a:xfrm>
+        </p:spPr>
+        <p:txBody>
+          <a:bodyPr vert="horz" lIns="91440" tIns="45720" rIns="91440" bIns="45720" rtlCol="0" anchor="t">
+            <a:normAutofit fontScale="92500" lnSpcReduction="20000"/>
+          </a:bodyPr>
+          <a:lstStyle/>
+          <a:p>
+            <a:pPr marL="914400" indent="-914400">
+              <a:buAutoNum type="arabicPeriod"/>
+            </a:pPr>
+            <a:r>
+              <a:rPr lang="en-US" altLang="en-US" sz="5400" dirty="0"/>
+              <a:t>Function Definition</a:t>
+            </a:r>
+          </a:p>
+          <a:p>
+            <a:pPr marL="914400" indent="-914400">
+              <a:buAutoNum type="arabicPeriod"/>
+            </a:pPr>
+            <a:r>
+              <a:rPr lang="en-US" altLang="en-US" sz="5400" dirty="0"/>
+              <a:t>Calling Function</a:t>
+            </a:r>
+          </a:p>
+          <a:p>
+            <a:pPr marL="914400" indent="-914400">
+              <a:buAutoNum type="arabicPeriod"/>
+            </a:pPr>
+            <a:r>
+              <a:rPr lang="en-US" altLang="en-US" sz="5400" dirty="0"/>
+              <a:t>Called Function</a:t>
+            </a:r>
+          </a:p>
+          <a:p>
+            <a:pPr marL="914400" indent="-914400">
+              <a:buAutoNum type="arabicPeriod"/>
+            </a:pPr>
+            <a:r>
+              <a:rPr lang="en-US" altLang="en-US" sz="5400" dirty="0"/>
+              <a:t>Parameters (arguments, variables)</a:t>
+            </a:r>
+          </a:p>
+          <a:p>
+            <a:pPr marL="914400" indent="-914400">
+              <a:buAutoNum type="arabicPeriod"/>
+            </a:pPr>
+            <a:r>
+              <a:rPr lang="en-US" altLang="en-US" sz="5400" dirty="0"/>
+              <a:t>Return value from the called function</a:t>
+            </a:r>
+          </a:p>
+        </p:txBody>
+      </p:sp>
+      <p:sp>
+        <p:nvSpPr>
+          <p:cNvPr id="3" name="TextBox 2">
+            <a:extLst>
+              <a:ext uri="{FF2B5EF4-FFF2-40B4-BE49-F238E27FC236}">
+                <a16:creationId xmlns:a16="http://schemas.microsoft.com/office/drawing/2014/main" id="{25F00EF3-70C3-32DB-02AF-51455AB20D6F}"/>
+              </a:ext>
+            </a:extLst>
+          </p:cNvPr>
+          <p:cNvSpPr txBox="1"/>
+          <p:nvPr/>
+        </p:nvSpPr>
+        <p:spPr>
+          <a:xfrm>
+            <a:off x="569343" y="6142039"/>
+            <a:ext cx="3226279" cy="276999"/>
+          </a:xfrm>
+          <a:prstGeom prst="rect">
+            <a:avLst/>
+          </a:prstGeom>
+          <a:noFill/>
+        </p:spPr>
+        <p:txBody>
+          <a:bodyPr wrap="square" rtlCol="0">
+            <a:spAutoFit/>
+          </a:bodyPr>
+          <a:lstStyle/>
+          <a:p>
+            <a:r>
+              <a:rPr lang="en-US" sz="1200" dirty="0"/>
+              <a:t>C Sharp Workshop for Bucks College Group</a:t>
+            </a:r>
+          </a:p>
+        </p:txBody>
+      </p:sp>
+      <p:sp>
+        <p:nvSpPr>
+          <p:cNvPr id="4" name="TextBox 3">
+            <a:extLst>
+              <a:ext uri="{FF2B5EF4-FFF2-40B4-BE49-F238E27FC236}">
+                <a16:creationId xmlns:a16="http://schemas.microsoft.com/office/drawing/2014/main" id="{49E4D80E-8AAB-6C00-1319-EA17C69A7EDE}"/>
+              </a:ext>
+            </a:extLst>
+          </p:cNvPr>
+          <p:cNvSpPr txBox="1"/>
+          <p:nvPr/>
+        </p:nvSpPr>
+        <p:spPr>
+          <a:xfrm>
+            <a:off x="8589034" y="6143024"/>
+            <a:ext cx="3226279" cy="276999"/>
+          </a:xfrm>
+          <a:prstGeom prst="rect">
+            <a:avLst/>
+          </a:prstGeom>
+          <a:noFill/>
+        </p:spPr>
+        <p:txBody>
+          <a:bodyPr wrap="square" rtlCol="0">
+            <a:spAutoFit/>
+          </a:bodyPr>
+          <a:lstStyle/>
+          <a:p>
+            <a:r>
+              <a:rPr lang="en-US" sz="1200" dirty="0"/>
+              <a:t>Programming Tutor: Jay (Vijayasimha BR)</a:t>
+            </a:r>
+          </a:p>
+        </p:txBody>
+      </p:sp>
+    </p:spTree>
+    <p:extLst>
+      <p:ext uri="{BB962C8B-B14F-4D97-AF65-F5344CB8AC3E}">
+        <p14:creationId xmlns:p14="http://schemas.microsoft.com/office/powerpoint/2010/main" val="1130318807"/>
+      </p:ext>
+    </p:extLst>
+  </p:cSld>
+  <p:clrMapOvr>
+    <a:masterClrMapping/>
+  </p:clrMapOvr>
+  <mc:AlternateContent xmlns:mc="http://schemas.openxmlformats.org/markup-compatibility/2006">
+    <mc:Choice xmlns:p14="http://schemas.microsoft.com/office/powerpoint/2010/main" Requires="p14">
+      <p:transition spd="med" p14:dur="700">
+        <p:fade/>
+      </p:transition>
+    </mc:Choice>
+    <mc:Fallback>
+      <p:transition spd="med">
+        <p:fade/>
+      </p:transition>
+    </mc:Fallback>
+  </mc:AlternateContent>
+</p:sld>
+</file>
+
+<file path=ppt/slides/slide16.xml><?xml version="1.0" encoding="utf-8"?>
+<p:sld xmlns:a="http://schemas.openxmlformats.org/drawingml/2006/main" xmlns:r="http://schemas.openxmlformats.org/officeDocument/2006/relationships" xmlns:p="http://schemas.openxmlformats.org/presentationml/2006/main">
+  <p:cSld>
+    <p:bg>
+      <p:bgPr>
+        <a:solidFill>
+          <a:schemeClr val="accent3"/>
+        </a:solidFill>
+        <a:effectLst/>
+      </p:bgPr>
+    </p:bg>
+    <p:spTree>
+      <p:nvGrpSpPr>
+        <p:cNvPr id="1" name=""/>
+        <p:cNvGrpSpPr/>
+        <p:nvPr/>
+      </p:nvGrpSpPr>
+      <p:grpSpPr>
+        <a:xfrm>
+          <a:off x="0" y="0"/>
+          <a:ext cx="0" cy="0"/>
+          <a:chOff x="0" y="0"/>
+          <a:chExt cx="0" cy="0"/>
+        </a:xfrm>
+      </p:grpSpPr>
+      <p:sp>
+        <p:nvSpPr>
+          <p:cNvPr id="5" name="Title 4">
+            <a:extLst>
+              <a:ext uri="{FF2B5EF4-FFF2-40B4-BE49-F238E27FC236}">
+                <a16:creationId xmlns:a16="http://schemas.microsoft.com/office/drawing/2014/main" id="{E8C5EA60-12FC-4FB7-9CED-CDC28177F4B1}"/>
+              </a:ext>
+            </a:extLst>
+          </p:cNvPr>
+          <p:cNvSpPr>
+            <a:spLocks noGrp="1"/>
+          </p:cNvSpPr>
+          <p:nvPr>
+            <p:ph type="title"/>
+          </p:nvPr>
+        </p:nvSpPr>
+        <p:spPr/>
+        <p:txBody>
+          <a:bodyPr/>
+          <a:lstStyle/>
+          <a:p>
+            <a:r>
+              <a:rPr lang="en-US" dirty="0"/>
               <a:t>Day 1 : Introduction to C # and.NET</a:t>
             </a:r>
           </a:p>
@@ -5480,7 +6330,7 @@
 </p:sld>
 </file>
 
-<file path=ppt/slides/slide13.xml><?xml version="1.0" encoding="utf-8"?>
+<file path=ppt/slides/slide17.xml><?xml version="1.0" encoding="utf-8"?>
 <p:sld xmlns:a="http://schemas.openxmlformats.org/drawingml/2006/main" xmlns:r="http://schemas.openxmlformats.org/officeDocument/2006/relationships" xmlns:p="http://schemas.openxmlformats.org/presentationml/2006/main">
   <p:cSld>
     <p:spTree>
@@ -5766,7 +6616,7 @@
 </p:sld>
 </file>
 
-<file path=ppt/slides/slide14.xml><?xml version="1.0" encoding="utf-8"?>
+<file path=ppt/slides/slide18.xml><?xml version="1.0" encoding="utf-8"?>
 <p:sld xmlns:a="http://schemas.openxmlformats.org/drawingml/2006/main" xmlns:r="http://schemas.openxmlformats.org/officeDocument/2006/relationships" xmlns:p="http://schemas.openxmlformats.org/presentationml/2006/main">
   <p:cSld>
     <p:spTree>
@@ -7798,13 +8648,13 @@
   <p:clrMapOvr>
     <a:masterClrMapping/>
   </p:clrMapOvr>
-  <mc:AlternateContent xmlns:mc="http://schemas.openxmlformats.org/markup-compatibility/2006">
-    <mc:Choice xmlns:p14="http://schemas.microsoft.com/office/powerpoint/2010/main" Requires="p14">
+  <mc:AlternateContent xmlns:mc="http://schemas.openxmlformats.org/markup-compatibility/2006" xmlns:p14="http://schemas.microsoft.com/office/powerpoint/2010/main">
+    <mc:Choice Requires="p14">
       <p:transition spd="med" p14:dur="700">
         <p:fade/>
       </p:transition>
     </mc:Choice>
-    <mc:Fallback>
+    <mc:Fallback xmlns="">
       <p:transition spd="med">
         <p:fade/>
       </p:transition>
@@ -8593,25 +9443,6 @@
 </file>
 
 <file path=customXml/item1.xml><?xml version="1.0" encoding="utf-8"?>
-<p:properties xmlns:p="http://schemas.microsoft.com/office/2006/metadata/properties" xmlns:xsi="http://www.w3.org/2001/XMLSchema-instance" xmlns:pc="http://schemas.microsoft.com/office/infopath/2007/PartnerControls">
-  <documentManagement>
-    <Status xmlns="71af3243-3dd4-4a8d-8c0d-dd76da1f02a5">Not started</Status>
-    <_ip_UnifiedCompliancePolicyUIAction xmlns="http://schemas.microsoft.com/sharepoint/v3" xsi:nil="true"/>
-    <Image xmlns="71af3243-3dd4-4a8d-8c0d-dd76da1f02a5">
-      <Url xsi:nil="true"/>
-      <Description xsi:nil="true"/>
-    </Image>
-    <_ip_UnifiedCompliancePolicyProperties xmlns="http://schemas.microsoft.com/sharepoint/v3" xsi:nil="true"/>
-    <lcf76f155ced4ddcb4097134ff3c332f xmlns="71af3243-3dd4-4a8d-8c0d-dd76da1f02a5">
-      <Terms xmlns="http://schemas.microsoft.com/office/infopath/2007/PartnerControls"/>
-    </lcf76f155ced4ddcb4097134ff3c332f>
-    <TaxCatchAll xmlns="230e9df3-be65-4c73-a93b-d1236ebd677e"/>
-    <MediaServiceKeyPoints xmlns="71af3243-3dd4-4a8d-8c0d-dd76da1f02a5" xsi:nil="true"/>
-  </documentManagement>
-</p:properties>
-</file>
-
-<file path=customXml/item2.xml><?xml version="1.0" encoding="utf-8"?>
 <ct:contentTypeSchema xmlns:ct="http://schemas.microsoft.com/office/2006/metadata/contentType" xmlns:ma="http://schemas.microsoft.com/office/2006/metadata/properties/metaAttributes" ct:_="" ma:_="" ma:contentTypeName="Document" ma:contentTypeID="0x01010079F111ED35F8CC479449609E8A0923A6" ma:contentTypeVersion="18" ma:contentTypeDescription="Create a new document." ma:contentTypeScope="" ma:versionID="22a266b9fa9a230c5a512669d8b298c3">
   <xsd:schema xmlns:xsd="http://www.w3.org/2001/XMLSchema" xmlns:xs="http://www.w3.org/2001/XMLSchema" xmlns:p="http://schemas.microsoft.com/office/2006/metadata/properties" xmlns:ns1="http://schemas.microsoft.com/sharepoint/v3" xmlns:ns2="71af3243-3dd4-4a8d-8c0d-dd76da1f02a5" xmlns:ns3="16c05727-aa75-4e4a-9b5f-8a80a1165891" xmlns:ns4="230e9df3-be65-4c73-a93b-d1236ebd677e" targetNamespace="http://schemas.microsoft.com/office/2006/metadata/properties" ma:root="true" ma:fieldsID="eddc33fff6b14141ee5c74a0d29ea6a1" ns1:_="" ns2:_="" ns3:_="" ns4:_="">
     <xsd:import namespace="http://schemas.microsoft.com/sharepoint/v3"/>
@@ -8887,6 +9718,25 @@
 </ct:contentTypeSchema>
 </file>
 
+<file path=customXml/item2.xml><?xml version="1.0" encoding="utf-8"?>
+<p:properties xmlns:p="http://schemas.microsoft.com/office/2006/metadata/properties" xmlns:xsi="http://www.w3.org/2001/XMLSchema-instance" xmlns:pc="http://schemas.microsoft.com/office/infopath/2007/PartnerControls">
+  <documentManagement>
+    <Status xmlns="71af3243-3dd4-4a8d-8c0d-dd76da1f02a5">Not started</Status>
+    <_ip_UnifiedCompliancePolicyUIAction xmlns="http://schemas.microsoft.com/sharepoint/v3" xsi:nil="true"/>
+    <Image xmlns="71af3243-3dd4-4a8d-8c0d-dd76da1f02a5">
+      <Url xsi:nil="true"/>
+      <Description xsi:nil="true"/>
+    </Image>
+    <_ip_UnifiedCompliancePolicyProperties xmlns="http://schemas.microsoft.com/sharepoint/v3" xsi:nil="true"/>
+    <lcf76f155ced4ddcb4097134ff3c332f xmlns="71af3243-3dd4-4a8d-8c0d-dd76da1f02a5">
+      <Terms xmlns="http://schemas.microsoft.com/office/infopath/2007/PartnerControls"/>
+    </lcf76f155ced4ddcb4097134ff3c332f>
+    <TaxCatchAll xmlns="230e9df3-be65-4c73-a93b-d1236ebd677e"/>
+    <MediaServiceKeyPoints xmlns="71af3243-3dd4-4a8d-8c0d-dd76da1f02a5" xsi:nil="true"/>
+  </documentManagement>
+</p:properties>
+</file>
+
 <file path=customXml/item3.xml><?xml version="1.0" encoding="utf-8"?>
 <?mso-contentType ?>
 <FormTemplates xmlns="http://schemas.microsoft.com/sharepoint/v3/contenttype/forms">
@@ -8897,18 +9747,6 @@
 </file>
 
 <file path=customXml/itemProps1.xml><?xml version="1.0" encoding="utf-8"?>
-<ds:datastoreItem xmlns:ds="http://schemas.openxmlformats.org/officeDocument/2006/customXml" ds:itemID="{4E18D074-6F3D-488C-8220-03C2DEFDE854}">
-  <ds:schemaRefs>
-    <ds:schemaRef ds:uri="http://schemas.microsoft.com/office/2006/metadata/properties"/>
-    <ds:schemaRef ds:uri="http://schemas.microsoft.com/office/infopath/2007/PartnerControls"/>
-    <ds:schemaRef ds:uri="71af3243-3dd4-4a8d-8c0d-dd76da1f02a5"/>
-    <ds:schemaRef ds:uri="http://schemas.microsoft.com/sharepoint/v3"/>
-    <ds:schemaRef ds:uri="230e9df3-be65-4c73-a93b-d1236ebd677e"/>
-  </ds:schemaRefs>
-</ds:datastoreItem>
-</file>
-
-<file path=customXml/itemProps2.xml><?xml version="1.0" encoding="utf-8"?>
 <ds:datastoreItem xmlns:ds="http://schemas.openxmlformats.org/officeDocument/2006/customXml" ds:itemID="{1D141EBB-3386-4164-A294-111C6309E33E}">
   <ds:schemaRefs>
     <ds:schemaRef ds:uri="http://schemas.microsoft.com/office/2006/metadata/contentType"/>
@@ -8929,6 +9767,18 @@
 </ds:datastoreItem>
 </file>
 
+<file path=customXml/itemProps2.xml><?xml version="1.0" encoding="utf-8"?>
+<ds:datastoreItem xmlns:ds="http://schemas.openxmlformats.org/officeDocument/2006/customXml" ds:itemID="{4E18D074-6F3D-488C-8220-03C2DEFDE854}">
+  <ds:schemaRefs>
+    <ds:schemaRef ds:uri="http://schemas.microsoft.com/office/2006/metadata/properties"/>
+    <ds:schemaRef ds:uri="http://schemas.microsoft.com/office/infopath/2007/PartnerControls"/>
+    <ds:schemaRef ds:uri="71af3243-3dd4-4a8d-8c0d-dd76da1f02a5"/>
+    <ds:schemaRef ds:uri="http://schemas.microsoft.com/sharepoint/v3"/>
+    <ds:schemaRef ds:uri="230e9df3-be65-4c73-a93b-d1236ebd677e"/>
+  </ds:schemaRefs>
+</ds:datastoreItem>
+</file>
+
 <file path=customXml/itemProps3.xml><?xml version="1.0" encoding="utf-8"?>
 <ds:datastoreItem xmlns:ds="http://schemas.openxmlformats.org/officeDocument/2006/customXml" ds:itemID="{0F9CE79C-5104-4273-B83B-D03AD839A8F7}">
   <ds:schemaRefs>

</xml_diff>